<commit_message>
Update slides and kata setup
</commit_message>
<xml_diff>
--- a/slides.pptx
+++ b/slides.pptx
@@ -521,7 +521,7 @@
           <a:p>
             <a:fld id="{AE68AD79-1D76-074A-BA18-519120094622}" type="datetimeFigureOut">
               <a:rPr lang="en-US" smtClean="0"/>
-              <a:t>10/9/25</a:t>
+              <a:t>10/12/25</a:t>
             </a:fld>
             <a:endParaRPr lang="en-US"/>
           </a:p>
@@ -753,7 +753,7 @@
           <a:p>
             <a:fld id="{AE68AD79-1D76-074A-BA18-519120094622}" type="datetimeFigureOut">
               <a:rPr lang="en-US" smtClean="0"/>
-              <a:t>10/9/25</a:t>
+              <a:t>10/12/25</a:t>
             </a:fld>
             <a:endParaRPr lang="en-US"/>
           </a:p>
@@ -1270,7 +1270,7 @@
           <a:p>
             <a:fld id="{AE68AD79-1D76-074A-BA18-519120094622}" type="datetimeFigureOut">
               <a:rPr lang="en-US" smtClean="0"/>
-              <a:t>10/9/25</a:t>
+              <a:t>10/12/25</a:t>
             </a:fld>
             <a:endParaRPr lang="en-US"/>
           </a:p>
@@ -1559,7 +1559,7 @@
           <a:p>
             <a:fld id="{AE68AD79-1D76-074A-BA18-519120094622}" type="datetimeFigureOut">
               <a:rPr lang="en-US" smtClean="0"/>
-              <a:t>10/9/25</a:t>
+              <a:t>10/12/25</a:t>
             </a:fld>
             <a:endParaRPr lang="en-US"/>
           </a:p>
@@ -1995,7 +1995,7 @@
           <a:p>
             <a:fld id="{AE68AD79-1D76-074A-BA18-519120094622}" type="datetimeFigureOut">
               <a:rPr lang="en-US" smtClean="0"/>
-              <a:t>10/9/25</a:t>
+              <a:t>10/12/25</a:t>
             </a:fld>
             <a:endParaRPr lang="en-US"/>
           </a:p>
@@ -2160,7 +2160,7 @@
           <a:p>
             <a:fld id="{AE68AD79-1D76-074A-BA18-519120094622}" type="datetimeFigureOut">
               <a:rPr lang="en-US" smtClean="0"/>
-              <a:t>10/9/25</a:t>
+              <a:t>10/12/25</a:t>
             </a:fld>
             <a:endParaRPr lang="en-US"/>
           </a:p>
@@ -2297,7 +2297,7 @@
           <a:p>
             <a:fld id="{AE68AD79-1D76-074A-BA18-519120094622}" type="datetimeFigureOut">
               <a:rPr lang="en-US" smtClean="0"/>
-              <a:t>10/9/25</a:t>
+              <a:t>10/12/25</a:t>
             </a:fld>
             <a:endParaRPr lang="en-US"/>
           </a:p>
@@ -2632,7 +2632,7 @@
           <a:p>
             <a:fld id="{AE68AD79-1D76-074A-BA18-519120094622}" type="datetimeFigureOut">
               <a:rPr lang="en-US" smtClean="0"/>
-              <a:t>10/9/25</a:t>
+              <a:t>10/12/25</a:t>
             </a:fld>
             <a:endParaRPr lang="en-US"/>
           </a:p>
@@ -2947,7 +2947,7 @@
           <a:p>
             <a:fld id="{AE68AD79-1D76-074A-BA18-519120094622}" type="datetimeFigureOut">
               <a:rPr lang="en-US" smtClean="0"/>
-              <a:t>10/9/25</a:t>
+              <a:t>10/12/25</a:t>
             </a:fld>
             <a:endParaRPr lang="en-US"/>
           </a:p>
@@ -3837,11 +3837,13 @@
         </p:nvSpPr>
         <p:spPr/>
         <p:txBody>
-          <a:bodyPr/>
-          <a:lstStyle/>
-          <a:p>
-            <a:r>
-              <a:rPr lang="en-US" dirty="0"/>
+          <a:bodyPr>
+            <a:normAutofit fontScale="92500"/>
+          </a:bodyPr>
+          <a:lstStyle/>
+          <a:p>
+            <a:r>
+              <a:rPr lang="en-US" sz="3200" b="1" dirty="0"/>
               <a:t>Safia Abdalla</a:t>
             </a:r>
           </a:p>
@@ -3850,6 +3852,29 @@
               <a:rPr lang="en-US" dirty="0"/>
               <a:t>Principal Software Engineer, Microsoft</a:t>
             </a:r>
+          </a:p>
+          <a:p>
+            <a:r>
+              <a:rPr lang="en-US" sz="3000" b="1" dirty="0" err="1"/>
+              <a:t>captainsafia.com</a:t>
+            </a:r>
+            <a:r>
+              <a:rPr lang="en-US" sz="3000" b="1" dirty="0"/>
+              <a:t> // </a:t>
+            </a:r>
+            <a:r>
+              <a:rPr lang="en-US" sz="3000" b="1" dirty="0" err="1"/>
+              <a:t>blog.safia.rocks</a:t>
+            </a:r>
+            <a:r>
+              <a:rPr lang="en-US" sz="3000" b="1" dirty="0"/>
+              <a:t> // @</a:t>
+            </a:r>
+            <a:r>
+              <a:rPr lang="en-US" sz="3000" b="1" dirty="0" err="1"/>
+              <a:t>captainsafia</a:t>
+            </a:r>
+            <a:endParaRPr lang="en-US" sz="3000" b="1" dirty="0"/>
           </a:p>
         </p:txBody>
       </p:sp>

</xml_diff>